<commit_message>
Update Assignment 1A Presentation.pptx
</commit_message>
<xml_diff>
--- a/Presentations/Assignment 1A Presentation.pptx
+++ b/Presentations/Assignment 1A Presentation.pptx
@@ -3878,8 +3878,8 @@
         </p:nvSpPr>
         <p:spPr>
           <a:xfrm>
-            <a:off x="495591" y="1825624"/>
-            <a:ext cx="5360758" cy="4667251"/>
+            <a:off x="838199" y="1825624"/>
+            <a:ext cx="10515600" cy="4667251"/>
           </a:xfrm>
         </p:spPr>
         <p:txBody>
@@ -3889,324 +3889,51 @@
           <a:lstStyle/>
           <a:p>
             <a:r>
+              <a:rPr lang="en-US" sz="2400" dirty="0"/>
+              <a:t>Paper was well structured and easy to follow</a:t>
+            </a:r>
+          </a:p>
+          <a:p>
+            <a:r>
+              <a:rPr lang="en-US" sz="2400" dirty="0"/>
+              <a:t>Objective tree was well thought out and had good visuals</a:t>
+            </a:r>
+          </a:p>
+          <a:p>
+            <a:r>
+              <a:rPr lang="en-US" sz="2400" dirty="0"/>
+              <a:t>Technical feasibility was informative on the tasks at hand for the team</a:t>
+            </a:r>
+          </a:p>
+          <a:p>
+            <a:pPr lvl="1"/>
+            <a:r>
               <a:rPr lang="en-US" sz="2000" dirty="0"/>
-              <a:t>Paper does not follow proper formatting</a:t>
+              <a:t>Time feasibility set short term goals as well, long-term goals</a:t>
+            </a:r>
+          </a:p>
+          <a:p>
+            <a:r>
+              <a:rPr lang="en-US" sz="2400" dirty="0"/>
+              <a:t>Requirement Specifications was thorough</a:t>
             </a:r>
           </a:p>
           <a:p>
             <a:pPr lvl="1"/>
             <a:r>
-              <a:rPr lang="en-US" sz="1800" dirty="0"/>
-              <a:t>No cover page, no title, no member names, no introduction, Google Docs</a:t>
-            </a:r>
-          </a:p>
-          <a:p>
-            <a:r>
               <a:rPr lang="en-US" sz="2000" dirty="0"/>
-              <a:t>Scope of work needs describe the project more thoroughly</a:t>
+              <a:t>This section really emphasized more goals for the team while also introducing the board requirements</a:t>
             </a:r>
           </a:p>
           <a:p>
             <a:pPr lvl="1"/>
             <a:r>
-              <a:rPr lang="en-US" sz="1800" dirty="0"/>
-              <a:t>The “Requirement Specifications” section could possibly substitute the Scope of Work</a:t>
-            </a:r>
-          </a:p>
-          <a:p>
-            <a:r>
               <a:rPr lang="en-US" sz="2000" dirty="0"/>
-              <a:t>Level 0 Diagram </a:t>
-            </a:r>
-          </a:p>
-          <a:p>
-            <a:pPr lvl="1"/>
-            <a:r>
-              <a:rPr lang="en-US" sz="1800" dirty="0"/>
-              <a:t>Consider replacing delivery code with Package Recognition</a:t>
-            </a:r>
-          </a:p>
-          <a:p>
-            <a:pPr lvl="1"/>
-            <a:r>
-              <a:rPr lang="en-US" sz="1800" dirty="0"/>
-              <a:t>Video feed should be an input</a:t>
-            </a:r>
-          </a:p>
-          <a:p>
-            <a:pPr lvl="1"/>
-            <a:r>
-              <a:rPr lang="en-US" sz="1800" dirty="0"/>
-              <a:t>Arm control should be an output</a:t>
-            </a:r>
-          </a:p>
-          <a:p>
-            <a:pPr lvl="1"/>
-            <a:r>
-              <a:rPr lang="en-US" sz="1800" dirty="0"/>
-              <a:t>Package delivery seems vague as an output</a:t>
-            </a:r>
-          </a:p>
-          <a:p>
-            <a:pPr lvl="1"/>
-            <a:r>
-              <a:rPr lang="en-US" sz="1800" dirty="0"/>
-              <a:t>Consider removing mobility</a:t>
-            </a:r>
-          </a:p>
-          <a:p>
-            <a:pPr lvl="1"/>
-            <a:r>
-              <a:rPr lang="en-US" sz="1800" dirty="0"/>
-              <a:t>Vague</a:t>
-            </a:r>
-          </a:p>
-        </p:txBody>
-      </p:sp>
-      <p:sp>
-        <p:nvSpPr>
-          <p:cNvPr id="5" name="Content Placeholder 2">
-            <a:extLst>
-              <a:ext uri="{FF2B5EF4-FFF2-40B4-BE49-F238E27FC236}">
-                <a16:creationId xmlns:a16="http://schemas.microsoft.com/office/drawing/2014/main" id="{3A85E72C-8934-4CA0-B95B-7DD18C1D79B5}"/>
-              </a:ext>
-            </a:extLst>
-          </p:cNvPr>
-          <p:cNvSpPr txBox="1">
-            <a:spLocks/>
-          </p:cNvSpPr>
-          <p:nvPr/>
-        </p:nvSpPr>
-        <p:spPr>
-          <a:xfrm>
-            <a:off x="5856349" y="1825623"/>
-            <a:ext cx="5018148" cy="4667251"/>
-          </a:xfrm>
-          <a:prstGeom prst="rect">
-            <a:avLst/>
-          </a:prstGeom>
-        </p:spPr>
-        <p:txBody>
-          <a:bodyPr vert="horz" lIns="91440" tIns="45720" rIns="91440" bIns="45720" rtlCol="0">
-            <a:normAutofit/>
-          </a:bodyPr>
-          <a:lstStyle>
-            <a:lvl1pPr marL="228600" indent="-228600" algn="l" defTabSz="914400" rtl="0" eaLnBrk="1" latinLnBrk="0" hangingPunct="1">
-              <a:lnSpc>
-                <a:spcPct val="90000"/>
-              </a:lnSpc>
-              <a:spcBef>
-                <a:spcPts val="1000"/>
-              </a:spcBef>
-              <a:buFont typeface="Arial" panose="020B0604020202020204" pitchFamily="34" charset="0"/>
-              <a:buChar char="•"/>
-              <a:defRPr sz="2800" kern="1200">
-                <a:solidFill>
-                  <a:schemeClr val="tx1"/>
-                </a:solidFill>
-                <a:latin typeface="+mn-lt"/>
-                <a:ea typeface="+mn-ea"/>
-                <a:cs typeface="+mn-cs"/>
-              </a:defRPr>
-            </a:lvl1pPr>
-            <a:lvl2pPr marL="685800" indent="-228600" algn="l" defTabSz="914400" rtl="0" eaLnBrk="1" latinLnBrk="0" hangingPunct="1">
-              <a:lnSpc>
-                <a:spcPct val="90000"/>
-              </a:lnSpc>
-              <a:spcBef>
-                <a:spcPts val="500"/>
-              </a:spcBef>
-              <a:buFont typeface="Arial" panose="020B0604020202020204" pitchFamily="34" charset="0"/>
-              <a:buChar char="•"/>
-              <a:defRPr sz="2400" kern="1200">
-                <a:solidFill>
-                  <a:schemeClr val="tx1"/>
-                </a:solidFill>
-                <a:latin typeface="+mn-lt"/>
-                <a:ea typeface="+mn-ea"/>
-                <a:cs typeface="+mn-cs"/>
-              </a:defRPr>
-            </a:lvl2pPr>
-            <a:lvl3pPr marL="1143000" indent="-228600" algn="l" defTabSz="914400" rtl="0" eaLnBrk="1" latinLnBrk="0" hangingPunct="1">
-              <a:lnSpc>
-                <a:spcPct val="90000"/>
-              </a:lnSpc>
-              <a:spcBef>
-                <a:spcPts val="500"/>
-              </a:spcBef>
-              <a:buFont typeface="Arial" panose="020B0604020202020204" pitchFamily="34" charset="0"/>
-              <a:buChar char="•"/>
-              <a:defRPr sz="2000" kern="1200">
-                <a:solidFill>
-                  <a:schemeClr val="tx1"/>
-                </a:solidFill>
-                <a:latin typeface="+mn-lt"/>
-                <a:ea typeface="+mn-ea"/>
-                <a:cs typeface="+mn-cs"/>
-              </a:defRPr>
-            </a:lvl3pPr>
-            <a:lvl4pPr marL="1600200" indent="-228600" algn="l" defTabSz="914400" rtl="0" eaLnBrk="1" latinLnBrk="0" hangingPunct="1">
-              <a:lnSpc>
-                <a:spcPct val="90000"/>
-              </a:lnSpc>
-              <a:spcBef>
-                <a:spcPts val="500"/>
-              </a:spcBef>
-              <a:buFont typeface="Arial" panose="020B0604020202020204" pitchFamily="34" charset="0"/>
-              <a:buChar char="•"/>
-              <a:defRPr sz="1800" kern="1200">
-                <a:solidFill>
-                  <a:schemeClr val="tx1"/>
-                </a:solidFill>
-                <a:latin typeface="+mn-lt"/>
-                <a:ea typeface="+mn-ea"/>
-                <a:cs typeface="+mn-cs"/>
-              </a:defRPr>
-            </a:lvl4pPr>
-            <a:lvl5pPr marL="2057400" indent="-228600" algn="l" defTabSz="914400" rtl="0" eaLnBrk="1" latinLnBrk="0" hangingPunct="1">
-              <a:lnSpc>
-                <a:spcPct val="90000"/>
-              </a:lnSpc>
-              <a:spcBef>
-                <a:spcPts val="500"/>
-              </a:spcBef>
-              <a:buFont typeface="Arial" panose="020B0604020202020204" pitchFamily="34" charset="0"/>
-              <a:buChar char="•"/>
-              <a:defRPr sz="1800" kern="1200">
-                <a:solidFill>
-                  <a:schemeClr val="tx1"/>
-                </a:solidFill>
-                <a:latin typeface="+mn-lt"/>
-                <a:ea typeface="+mn-ea"/>
-                <a:cs typeface="+mn-cs"/>
-              </a:defRPr>
-            </a:lvl5pPr>
-            <a:lvl6pPr marL="2514600" indent="-228600" algn="l" defTabSz="914400" rtl="0" eaLnBrk="1" latinLnBrk="0" hangingPunct="1">
-              <a:lnSpc>
-                <a:spcPct val="90000"/>
-              </a:lnSpc>
-              <a:spcBef>
-                <a:spcPts val="500"/>
-              </a:spcBef>
-              <a:buFont typeface="Arial" panose="020B0604020202020204" pitchFamily="34" charset="0"/>
-              <a:buChar char="•"/>
-              <a:defRPr sz="1800" kern="1200">
-                <a:solidFill>
-                  <a:schemeClr val="tx1"/>
-                </a:solidFill>
-                <a:latin typeface="+mn-lt"/>
-                <a:ea typeface="+mn-ea"/>
-                <a:cs typeface="+mn-cs"/>
-              </a:defRPr>
-            </a:lvl6pPr>
-            <a:lvl7pPr marL="2971800" indent="-228600" algn="l" defTabSz="914400" rtl="0" eaLnBrk="1" latinLnBrk="0" hangingPunct="1">
-              <a:lnSpc>
-                <a:spcPct val="90000"/>
-              </a:lnSpc>
-              <a:spcBef>
-                <a:spcPts val="500"/>
-              </a:spcBef>
-              <a:buFont typeface="Arial" panose="020B0604020202020204" pitchFamily="34" charset="0"/>
-              <a:buChar char="•"/>
-              <a:defRPr sz="1800" kern="1200">
-                <a:solidFill>
-                  <a:schemeClr val="tx1"/>
-                </a:solidFill>
-                <a:latin typeface="+mn-lt"/>
-                <a:ea typeface="+mn-ea"/>
-                <a:cs typeface="+mn-cs"/>
-              </a:defRPr>
-            </a:lvl7pPr>
-            <a:lvl8pPr marL="3429000" indent="-228600" algn="l" defTabSz="914400" rtl="0" eaLnBrk="1" latinLnBrk="0" hangingPunct="1">
-              <a:lnSpc>
-                <a:spcPct val="90000"/>
-              </a:lnSpc>
-              <a:spcBef>
-                <a:spcPts val="500"/>
-              </a:spcBef>
-              <a:buFont typeface="Arial" panose="020B0604020202020204" pitchFamily="34" charset="0"/>
-              <a:buChar char="•"/>
-              <a:defRPr sz="1800" kern="1200">
-                <a:solidFill>
-                  <a:schemeClr val="tx1"/>
-                </a:solidFill>
-                <a:latin typeface="+mn-lt"/>
-                <a:ea typeface="+mn-ea"/>
-                <a:cs typeface="+mn-cs"/>
-              </a:defRPr>
-            </a:lvl8pPr>
-            <a:lvl9pPr marL="3886200" indent="-228600" algn="l" defTabSz="914400" rtl="0" eaLnBrk="1" latinLnBrk="0" hangingPunct="1">
-              <a:lnSpc>
-                <a:spcPct val="90000"/>
-              </a:lnSpc>
-              <a:spcBef>
-                <a:spcPts val="500"/>
-              </a:spcBef>
-              <a:buFont typeface="Arial" panose="020B0604020202020204" pitchFamily="34" charset="0"/>
-              <a:buChar char="•"/>
-              <a:defRPr sz="1800" kern="1200">
-                <a:solidFill>
-                  <a:schemeClr val="tx1"/>
-                </a:solidFill>
-                <a:latin typeface="+mn-lt"/>
-                <a:ea typeface="+mn-ea"/>
-                <a:cs typeface="+mn-cs"/>
-              </a:defRPr>
-            </a:lvl9pPr>
-          </a:lstStyle>
-          <a:p>
-            <a:r>
-              <a:rPr lang="en-US" sz="1800" dirty="0"/>
-              <a:t>Alternative and Tradeoffs</a:t>
-            </a:r>
-          </a:p>
-          <a:p>
-            <a:pPr lvl="1"/>
-            <a:r>
-              <a:rPr lang="en-US" sz="1800" dirty="0"/>
-              <a:t>Does not give many alternatives and examples</a:t>
-            </a:r>
-          </a:p>
-          <a:p>
-            <a:pPr lvl="1"/>
-            <a:r>
-              <a:rPr lang="en-US" sz="1800" dirty="0"/>
-              <a:t>Pixy Cam 2, block design, arms</a:t>
-            </a:r>
-          </a:p>
-          <a:p>
-            <a:r>
-              <a:rPr lang="en-US" sz="2000" dirty="0"/>
-              <a:t>Feasibility Assessment</a:t>
-            </a:r>
-          </a:p>
-          <a:p>
-            <a:pPr lvl="1"/>
-            <a:r>
-              <a:rPr lang="en-US" sz="2000" dirty="0"/>
-              <a:t>No itemization of potential/hard items</a:t>
-            </a:r>
-          </a:p>
-          <a:p>
-            <a:pPr lvl="1"/>
-            <a:r>
-              <a:rPr lang="en-US" sz="2000" dirty="0"/>
-              <a:t>No understanding of arm cost as reader</a:t>
-            </a:r>
-          </a:p>
-          <a:p>
-            <a:pPr lvl="1"/>
-            <a:r>
-              <a:rPr lang="en-US" sz="2000" dirty="0"/>
-              <a:t>Arm cost is mentioned in Technical Feasibility</a:t>
-            </a:r>
-          </a:p>
-          <a:p>
-            <a:pPr lvl="1"/>
-            <a:r>
-              <a:rPr lang="en-US" sz="2000" dirty="0"/>
-              <a:t>Only assesses one technical difficulty</a:t>
-            </a:r>
+              <a:t>This section had some points that were well stated, an example would be identifying the blocks</a:t>
+            </a:r>
+          </a:p>
+          <a:p>
+            <a:endParaRPr lang="en-US" sz="2400" dirty="0"/>
           </a:p>
         </p:txBody>
       </p:sp>

</xml_diff>